<commit_message>
Added explanations to the mechanics
</commit_message>
<xml_diff>
--- a/Character Sheet.pptx
+++ b/Character Sheet.pptx
@@ -1256,7 +1256,7 @@
           <a:p>
             <a:fld id="{BED8B029-3841-4136-9056-919269C44651}" type="datetimeFigureOut">
               <a:rPr lang="de-DE" smtClean="0"/>
-              <a:t>14.10.2023</a:t>
+              <a:t>20.10.2023</a:t>
             </a:fld>
             <a:endParaRPr lang="de-DE"/>
           </a:p>
@@ -1426,7 +1426,7 @@
           <a:p>
             <a:fld id="{BED8B029-3841-4136-9056-919269C44651}" type="datetimeFigureOut">
               <a:rPr lang="de-DE" smtClean="0"/>
-              <a:t>14.10.2023</a:t>
+              <a:t>20.10.2023</a:t>
             </a:fld>
             <a:endParaRPr lang="de-DE"/>
           </a:p>
@@ -1606,7 +1606,7 @@
           <a:p>
             <a:fld id="{BED8B029-3841-4136-9056-919269C44651}" type="datetimeFigureOut">
               <a:rPr lang="de-DE" smtClean="0"/>
-              <a:t>14.10.2023</a:t>
+              <a:t>20.10.2023</a:t>
             </a:fld>
             <a:endParaRPr lang="de-DE"/>
           </a:p>
@@ -1776,7 +1776,7 @@
           <a:p>
             <a:fld id="{BED8B029-3841-4136-9056-919269C44651}" type="datetimeFigureOut">
               <a:rPr lang="de-DE" smtClean="0"/>
-              <a:t>14.10.2023</a:t>
+              <a:t>20.10.2023</a:t>
             </a:fld>
             <a:endParaRPr lang="de-DE"/>
           </a:p>
@@ -2020,7 +2020,7 @@
           <a:p>
             <a:fld id="{BED8B029-3841-4136-9056-919269C44651}" type="datetimeFigureOut">
               <a:rPr lang="de-DE" smtClean="0"/>
-              <a:t>14.10.2023</a:t>
+              <a:t>20.10.2023</a:t>
             </a:fld>
             <a:endParaRPr lang="de-DE"/>
           </a:p>
@@ -2252,7 +2252,7 @@
           <a:p>
             <a:fld id="{BED8B029-3841-4136-9056-919269C44651}" type="datetimeFigureOut">
               <a:rPr lang="de-DE" smtClean="0"/>
-              <a:t>14.10.2023</a:t>
+              <a:t>20.10.2023</a:t>
             </a:fld>
             <a:endParaRPr lang="de-DE"/>
           </a:p>
@@ -2619,7 +2619,7 @@
           <a:p>
             <a:fld id="{BED8B029-3841-4136-9056-919269C44651}" type="datetimeFigureOut">
               <a:rPr lang="de-DE" smtClean="0"/>
-              <a:t>14.10.2023</a:t>
+              <a:t>20.10.2023</a:t>
             </a:fld>
             <a:endParaRPr lang="de-DE"/>
           </a:p>
@@ -2737,7 +2737,7 @@
           <a:p>
             <a:fld id="{BED8B029-3841-4136-9056-919269C44651}" type="datetimeFigureOut">
               <a:rPr lang="de-DE" smtClean="0"/>
-              <a:t>14.10.2023</a:t>
+              <a:t>20.10.2023</a:t>
             </a:fld>
             <a:endParaRPr lang="de-DE"/>
           </a:p>
@@ -2832,7 +2832,7 @@
           <a:p>
             <a:fld id="{BED8B029-3841-4136-9056-919269C44651}" type="datetimeFigureOut">
               <a:rPr lang="de-DE" smtClean="0"/>
-              <a:t>14.10.2023</a:t>
+              <a:t>20.10.2023</a:t>
             </a:fld>
             <a:endParaRPr lang="de-DE"/>
           </a:p>
@@ -3109,7 +3109,7 @@
           <a:p>
             <a:fld id="{BED8B029-3841-4136-9056-919269C44651}" type="datetimeFigureOut">
               <a:rPr lang="de-DE" smtClean="0"/>
-              <a:t>14.10.2023</a:t>
+              <a:t>20.10.2023</a:t>
             </a:fld>
             <a:endParaRPr lang="de-DE"/>
           </a:p>
@@ -3366,7 +3366,7 @@
           <a:p>
             <a:fld id="{BED8B029-3841-4136-9056-919269C44651}" type="datetimeFigureOut">
               <a:rPr lang="de-DE" smtClean="0"/>
-              <a:t>14.10.2023</a:t>
+              <a:t>20.10.2023</a:t>
             </a:fld>
             <a:endParaRPr lang="de-DE"/>
           </a:p>
@@ -3579,7 +3579,7 @@
           <a:p>
             <a:fld id="{BED8B029-3841-4136-9056-919269C44651}" type="datetimeFigureOut">
               <a:rPr lang="de-DE" smtClean="0"/>
-              <a:t>14.10.2023</a:t>
+              <a:t>20.10.2023</a:t>
             </a:fld>
             <a:endParaRPr lang="de-DE"/>
           </a:p>
@@ -5713,7 +5713,7 @@
         </p:nvSpPr>
         <p:spPr>
           <a:xfrm>
-            <a:off x="237748" y="5885633"/>
+            <a:off x="237748" y="4812737"/>
             <a:ext cx="2755638" cy="1977734"/>
           </a:xfrm>
           <a:prstGeom prst="roundRect">
@@ -5765,10 +5765,42 @@
           </a:p>
           <a:p>
             <a:pPr algn="ctr"/>
-            <a:endParaRPr lang="de-DE" sz="1400" dirty="0"/>
-          </a:p>
-          <a:p>
-            <a:pPr algn="ctr"/>
+            <a:r>
+              <a:rPr lang="de-DE" sz="1400" dirty="0"/>
+              <a:t>Rage O </a:t>
+            </a:r>
+            <a:r>
+              <a:rPr lang="de-DE" sz="1400" dirty="0" err="1"/>
+              <a:t>O</a:t>
+            </a:r>
+            <a:r>
+              <a:rPr lang="de-DE" sz="1400" dirty="0"/>
+              <a:t> </a:t>
+            </a:r>
+            <a:r>
+              <a:rPr lang="de-DE" sz="1400" dirty="0" err="1"/>
+              <a:t>O</a:t>
+            </a:r>
+            <a:endParaRPr lang="de-DE" sz="1400" dirty="0"/>
+          </a:p>
+          <a:p>
+            <a:pPr algn="ctr"/>
+            <a:r>
+              <a:rPr lang="de-DE" sz="1400" dirty="0"/>
+              <a:t>Fear O </a:t>
+            </a:r>
+            <a:r>
+              <a:rPr lang="de-DE" sz="1400" dirty="0" err="1"/>
+              <a:t>O</a:t>
+            </a:r>
+            <a:r>
+              <a:rPr lang="de-DE" sz="1400" dirty="0"/>
+              <a:t> </a:t>
+            </a:r>
+            <a:r>
+              <a:rPr lang="de-DE" sz="1400" dirty="0" err="1"/>
+              <a:t>O</a:t>
+            </a:r>
             <a:endParaRPr lang="de-DE" sz="1400" dirty="0"/>
           </a:p>
           <a:p>
@@ -5800,7 +5832,7 @@
         <p:spPr>
           <a:xfrm>
             <a:off x="237748" y="2713410"/>
-            <a:ext cx="6353553" cy="3037840"/>
+            <a:ext cx="6353553" cy="1977734"/>
           </a:xfrm>
           <a:prstGeom prst="roundRect">
             <a:avLst/>
@@ -5823,26 +5855,6 @@
         <p:txBody>
           <a:bodyPr rtlCol="0" anchor="ctr"/>
           <a:lstStyle/>
-          <a:p>
-            <a:pPr algn="ctr"/>
-            <a:endParaRPr lang="de-DE" sz="1400" dirty="0"/>
-          </a:p>
-          <a:p>
-            <a:pPr algn="ctr"/>
-            <a:endParaRPr lang="de-DE" sz="1400" dirty="0"/>
-          </a:p>
-          <a:p>
-            <a:pPr algn="ctr"/>
-            <a:endParaRPr lang="de-DE" sz="1400" dirty="0"/>
-          </a:p>
-          <a:p>
-            <a:pPr algn="ctr"/>
-            <a:endParaRPr lang="de-DE" sz="1400" dirty="0"/>
-          </a:p>
-          <a:p>
-            <a:pPr algn="ctr"/>
-            <a:endParaRPr lang="de-DE" sz="1400" dirty="0"/>
-          </a:p>
           <a:p>
             <a:pPr algn="ctr"/>
             <a:endParaRPr lang="de-DE" sz="1400" dirty="0"/>
@@ -5899,7 +5911,7 @@
         </p:nvSpPr>
         <p:spPr>
           <a:xfrm>
-            <a:off x="247649" y="7982907"/>
+            <a:off x="247649" y="6855147"/>
             <a:ext cx="6343653" cy="353012"/>
           </a:xfrm>
           <a:prstGeom prst="roundRect">
@@ -5946,8 +5958,8 @@
         </p:nvSpPr>
         <p:spPr>
           <a:xfrm>
-            <a:off x="247650" y="8510866"/>
-            <a:ext cx="2613657" cy="1037590"/>
+            <a:off x="5086948" y="7295364"/>
+            <a:ext cx="1513497" cy="880576"/>
           </a:xfrm>
           <a:prstGeom prst="roundRect">
             <a:avLst/>
@@ -5986,13 +5998,9 @@
           </a:p>
           <a:p>
             <a:pPr algn="ctr"/>
-            <a:endParaRPr lang="de-DE" sz="1400" dirty="0"/>
-          </a:p>
-          <a:p>
-            <a:pPr algn="ctr"/>
             <a:r>
               <a:rPr lang="de-DE" sz="1400" dirty="0" err="1"/>
-              <a:t>Adrenallin</a:t>
+              <a:t>Adrenaline</a:t>
             </a:r>
             <a:endParaRPr lang="de-DE" sz="1400" dirty="0"/>
           </a:p>
@@ -6012,8 +6020,8 @@
         </p:nvSpPr>
         <p:spPr>
           <a:xfrm>
-            <a:off x="2993386" y="8510866"/>
-            <a:ext cx="1969773" cy="1037590"/>
+            <a:off x="291301" y="7334946"/>
+            <a:ext cx="4683035" cy="2352566"/>
           </a:xfrm>
           <a:prstGeom prst="roundRect">
             <a:avLst/>
@@ -6038,43 +6046,57 @@
           <a:lstStyle/>
           <a:p>
             <a:pPr algn="ctr"/>
+            <a:endParaRPr lang="de-DE" sz="1400" dirty="0"/>
+          </a:p>
+          <a:p>
+            <a:pPr algn="ctr"/>
+            <a:endParaRPr lang="de-DE" sz="1400" dirty="0"/>
+          </a:p>
+          <a:p>
+            <a:pPr algn="ctr"/>
+            <a:endParaRPr lang="de-DE" sz="1400" dirty="0"/>
+          </a:p>
+          <a:p>
+            <a:pPr algn="ctr"/>
+            <a:endParaRPr lang="de-DE" sz="1400" dirty="0"/>
+          </a:p>
+          <a:p>
+            <a:pPr algn="ctr"/>
+            <a:r>
+              <a:rPr lang="de-DE" sz="1400" dirty="0" err="1"/>
+              <a:t>Adrenaline</a:t>
+            </a:r>
+            <a:endParaRPr lang="de-DE" sz="1400" dirty="0"/>
+          </a:p>
+          <a:p>
+            <a:pPr algn="ctr"/>
+            <a:endParaRPr lang="de-DE" sz="1400" dirty="0"/>
+          </a:p>
+          <a:p>
+            <a:pPr algn="ctr"/>
+            <a:endParaRPr lang="de-DE" sz="1400" dirty="0"/>
+          </a:p>
+          <a:p>
+            <a:pPr algn="ctr"/>
             <a:r>
               <a:rPr lang="de-DE" sz="1400" dirty="0"/>
-              <a:t>Rage O </a:t>
-            </a:r>
-            <a:r>
-              <a:rPr lang="de-DE" sz="1400" dirty="0" err="1"/>
-              <a:t>O</a:t>
-            </a:r>
+              <a:t> /5</a:t>
+            </a:r>
+          </a:p>
+          <a:p>
+            <a:pPr algn="ctr"/>
+            <a:endParaRPr lang="de-DE" sz="1400" dirty="0"/>
+          </a:p>
+          <a:p>
+            <a:pPr algn="ctr"/>
+            <a:endParaRPr lang="de-DE" sz="1400" dirty="0"/>
+          </a:p>
+          <a:p>
+            <a:pPr algn="ctr"/>
             <a:r>
               <a:rPr lang="de-DE" sz="1400" dirty="0"/>
-              <a:t> </a:t>
-            </a:r>
-            <a:r>
-              <a:rPr lang="de-DE" sz="1400" dirty="0" err="1"/>
-              <a:t>O</a:t>
-            </a:r>
-            <a:endParaRPr lang="de-DE" sz="1400" dirty="0"/>
-          </a:p>
-          <a:p>
-            <a:pPr algn="ctr"/>
-            <a:r>
-              <a:rPr lang="de-DE" sz="1400" dirty="0"/>
-              <a:t>Fear O </a:t>
-            </a:r>
-            <a:r>
-              <a:rPr lang="de-DE" sz="1400" dirty="0" err="1"/>
-              <a:t>O</a:t>
-            </a:r>
-            <a:r>
-              <a:rPr lang="de-DE" sz="1400" dirty="0"/>
-              <a:t> </a:t>
-            </a:r>
-            <a:r>
-              <a:rPr lang="de-DE" sz="1400" dirty="0" err="1"/>
-              <a:t>O</a:t>
-            </a:r>
-            <a:endParaRPr lang="de-DE" sz="1400" dirty="0"/>
+              <a:t>Exhaustion</a:t>
+            </a:r>
           </a:p>
         </p:txBody>
       </p:sp>
@@ -6092,8 +6114,8 @@
         </p:nvSpPr>
         <p:spPr>
           <a:xfrm>
-            <a:off x="5090160" y="8510866"/>
-            <a:ext cx="1501142" cy="1037590"/>
+            <a:off x="5081016" y="8268602"/>
+            <a:ext cx="1519430" cy="1279853"/>
           </a:xfrm>
           <a:prstGeom prst="roundRect">
             <a:avLst/>
@@ -6138,9 +6160,10 @@
           <a:p>
             <a:pPr algn="ctr"/>
             <a:r>
-              <a:rPr lang="de-DE" sz="1400" dirty="0"/>
-              <a:t>Mental HP</a:t>
-            </a:r>
+              <a:rPr lang="de-DE" sz="1400" dirty="0" err="1"/>
+              <a:t>Sanity</a:t>
+            </a:r>
+            <a:endParaRPr lang="de-DE" sz="1400" dirty="0"/>
           </a:p>
         </p:txBody>
       </p:sp>
@@ -6269,7 +6292,7 @@
         </p:nvSpPr>
         <p:spPr>
           <a:xfrm>
-            <a:off x="3134099" y="5931062"/>
+            <a:off x="3134099" y="4858166"/>
             <a:ext cx="3457202" cy="314695"/>
           </a:xfrm>
           <a:prstGeom prst="roundRect">
@@ -6316,7 +6339,7 @@
         </p:nvSpPr>
         <p:spPr>
           <a:xfrm>
-            <a:off x="3132847" y="6333657"/>
+            <a:off x="3132847" y="5260761"/>
             <a:ext cx="3457202" cy="655320"/>
           </a:xfrm>
           <a:prstGeom prst="roundRect">
@@ -6379,7 +6402,7 @@
         </p:nvSpPr>
         <p:spPr>
           <a:xfrm>
-            <a:off x="3132847" y="7108517"/>
+            <a:off x="3132847" y="6035621"/>
             <a:ext cx="3428476" cy="655320"/>
           </a:xfrm>
           <a:prstGeom prst="roundRect">

</xml_diff>